<commit_message>
inseri o Qr code no pdf
</commit_message>
<xml_diff>
--- a/mini_curso_Orientado_a_Objeto.pptx
+++ b/mini_curso_Orientado_a_Objeto.pptx
@@ -6,7 +6,7 @@
     <p:sldMasterId id="2147483661" r:id="rId2"/>
   </p:sldMasterIdLst>
   <p:notesMasterIdLst>
-    <p:notesMasterId r:id="rId10"/>
+    <p:notesMasterId r:id="rId11"/>
   </p:notesMasterIdLst>
   <p:sldIdLst>
     <p:sldId id="256" r:id="rId3"/>
@@ -16,6 +16,7 @@
     <p:sldId id="270" r:id="rId7"/>
     <p:sldId id="271" r:id="rId8"/>
     <p:sldId id="268" r:id="rId9"/>
+    <p:sldId id="272" r:id="rId10"/>
   </p:sldIdLst>
   <p:sldSz cx="9144000" cy="6858000" type="screen4x3"/>
   <p:notesSz cx="9144000" cy="6858000"/>
@@ -126,12 +127,53 @@
 <p1510:revInfo xmlns:a="http://schemas.openxmlformats.org/drawingml/2006/main" xmlns:r="http://schemas.openxmlformats.org/officeDocument/2006/relationships" xmlns:p1510="http://schemas.microsoft.com/office/powerpoint/2015/10/main">
   <p1510:revLst>
     <p1510:client id="{2162CB06-73DE-4CEE-AF67-73CDC63D60E9}" v="649" dt="2023-09-26T16:21:44.712"/>
+    <p1510:client id="{4CCEFCC1-3AAD-434E-8333-77DED29E6082}" v="75" dt="2023-09-26T17:15:12.270"/>
   </p1510:revLst>
 </p1510:revInfo>
 </file>
 
 <file path=ppt/changesInfos/changesInfo1.xml><?xml version="1.0" encoding="utf-8"?>
 <pc:chgInfo xmlns:a="http://schemas.openxmlformats.org/drawingml/2006/main" xmlns:r="http://schemas.openxmlformats.org/officeDocument/2006/relationships" xmlns:ac="http://schemas.microsoft.com/office/drawing/2013/main/command" xmlns:pc="http://schemas.microsoft.com/office/powerpoint/2013/main/command">
+  <pc:docChgLst>
+    <pc:chgData name="Jefferson Nascimento" userId="22829802104a17a7" providerId="Windows Live" clId="Web-{4CCEFCC1-3AAD-434E-8333-77DED29E6082}"/>
+    <pc:docChg chg="addSld modSld addSection delSection">
+      <pc:chgData name="Jefferson Nascimento" userId="22829802104a17a7" providerId="Windows Live" clId="Web-{4CCEFCC1-3AAD-434E-8333-77DED29E6082}" dt="2023-09-26T17:15:12.270" v="41" actId="14100"/>
+      <pc:docMkLst>
+        <pc:docMk/>
+      </pc:docMkLst>
+      <pc:sldChg chg="addSp delSp modSp add replId">
+        <pc:chgData name="Jefferson Nascimento" userId="22829802104a17a7" providerId="Windows Live" clId="Web-{4CCEFCC1-3AAD-434E-8333-77DED29E6082}" dt="2023-09-26T17:15:12.270" v="41" actId="14100"/>
+        <pc:sldMkLst>
+          <pc:docMk/>
+          <pc:sldMk cId="1662063946" sldId="272"/>
+        </pc:sldMkLst>
+        <pc:spChg chg="add mod">
+          <ac:chgData name="Jefferson Nascimento" userId="22829802104a17a7" providerId="Windows Live" clId="Web-{4CCEFCC1-3AAD-434E-8333-77DED29E6082}" dt="2023-09-26T17:15:03.254" v="39" actId="20577"/>
+          <ac:spMkLst>
+            <pc:docMk/>
+            <pc:sldMk cId="1662063946" sldId="272"/>
+            <ac:spMk id="4" creationId="{8ED9FFCB-A3AD-DEA2-EE28-47A1ACD57471}"/>
+          </ac:spMkLst>
+        </pc:spChg>
+        <pc:picChg chg="del">
+          <ac:chgData name="Jefferson Nascimento" userId="22829802104a17a7" providerId="Windows Live" clId="Web-{4CCEFCC1-3AAD-434E-8333-77DED29E6082}" dt="2023-09-26T17:13:44.299" v="3"/>
+          <ac:picMkLst>
+            <pc:docMk/>
+            <pc:sldMk cId="1662063946" sldId="272"/>
+            <ac:picMk id="2" creationId="{8E448F1A-04D1-2DCF-14B3-ACCED8899468}"/>
+          </ac:picMkLst>
+        </pc:picChg>
+        <pc:picChg chg="add mod">
+          <ac:chgData name="Jefferson Nascimento" userId="22829802104a17a7" providerId="Windows Live" clId="Web-{4CCEFCC1-3AAD-434E-8333-77DED29E6082}" dt="2023-09-26T17:15:12.270" v="41" actId="14100"/>
+          <ac:picMkLst>
+            <pc:docMk/>
+            <pc:sldMk cId="1662063946" sldId="272"/>
+            <ac:picMk id="3" creationId="{A5A85269-6B86-D3F6-6C97-447F2ADFBD12}"/>
+          </ac:picMkLst>
+        </pc:picChg>
+      </pc:sldChg>
+    </pc:docChg>
+  </pc:docChgLst>
   <pc:docChgLst>
     <pc:chgData name="Jefferson Nascimento" userId="22829802104a17a7" providerId="Windows Live" clId="Web-{2162CB06-73DE-4CEE-AF67-73CDC63D60E9}"/>
     <pc:docChg chg="mod addSld delSld modSld modMainMaster setSldSz">
@@ -1614,7 +1656,7 @@
               <a:rPr lang="pt-BR" sz="1400" b="0" strike="noStrike" spc="-1">
                 <a:latin typeface="Times New Roman"/>
               </a:rPr>
-              <a:t>‹nº›</a:t>
+              <a:t>‹#›</a:t>
             </a:fld>
             <a:endParaRPr lang="pt-BR" sz="1400" b="0" strike="noStrike" spc="-1">
               <a:latin typeface="Times New Roman"/>
@@ -4963,7 +5005,7 @@
                   <a:spcPts val="1426"/>
                 </a:lnSpc>
               </a:pPr>
-              <a:t>‹nº›</a:t>
+              <a:t>‹#›</a:t>
             </a:fld>
             <a:endParaRPr lang="pt-BR" sz="1200" b="0" strike="noStrike" spc="-1">
               <a:latin typeface="Times New Roman"/>
@@ -5834,7 +5876,7 @@
                   <a:spcPts val="1426"/>
                 </a:lnSpc>
               </a:pPr>
-              <a:t>‹nº›</a:t>
+              <a:t>‹#›</a:t>
             </a:fld>
             <a:endParaRPr lang="pt-BR" sz="1200" b="0" strike="noStrike" spc="-1">
               <a:latin typeface="Times New Roman"/>
@@ -6215,7 +6257,7 @@
                 <a:spcPts val="99"/>
               </a:spcBef>
             </a:pPr>
-            <a:endParaRPr lang="pt-BR" sz="3200" spc="-1" dirty="0">
+            <a:endParaRPr lang="pt-BR" sz="3200" spc="-1">
               <a:solidFill>
                 <a:srgbClr val="000000"/>
               </a:solidFill>
@@ -6406,7 +6448,7 @@
               </a:tabLst>
             </a:pPr>
             <a:r>
-              <a:rPr lang="pt-BR" sz="3200" spc="-1" dirty="0">
+              <a:rPr lang="pt-BR" sz="3200" spc="-1">
                 <a:solidFill>
                   <a:srgbClr val="000000"/>
                 </a:solidFill>
@@ -6414,7 +6456,7 @@
               </a:rPr>
               <a:t>Grupo</a:t>
             </a:r>
-            <a:endParaRPr lang="pt-BR" dirty="0"/>
+            <a:endParaRPr lang="pt-BR"/>
           </a:p>
         </p:txBody>
       </p:sp>
@@ -6450,7 +6492,7 @@
           <a:lstStyle/>
           <a:p>
             <a:r>
-              <a:rPr lang="pt-BR" b="1" dirty="0"/>
+              <a:rPr lang="pt-BR" b="1"/>
               <a:t>Jefferson C. Nascimento 202222112</a:t>
             </a:r>
           </a:p>
@@ -6488,13 +6530,13 @@
           <a:lstStyle/>
           <a:p>
             <a:r>
-              <a:rPr lang="pt-BR" sz="2400" b="1" dirty="0">
+              <a:rPr lang="pt-BR" sz="2400" b="1">
                 <a:ea typeface="+mn-lt"/>
                 <a:cs typeface="+mn-lt"/>
               </a:rPr>
               <a:t>Orientação a objetos com Python</a:t>
             </a:r>
-            <a:endParaRPr lang="pt-BR" sz="2400" b="1" dirty="0" err="1"/>
+            <a:endParaRPr lang="pt-BR" sz="2400" b="1" err="1"/>
           </a:p>
         </p:txBody>
       </p:sp>
@@ -6673,7 +6715,7 @@
                 <a:spcPts val="99"/>
               </a:spcBef>
             </a:pPr>
-            <a:endParaRPr lang="pt-BR" sz="3200" spc="-1" dirty="0">
+            <a:endParaRPr lang="pt-BR" sz="3200" spc="-1">
               <a:solidFill>
                 <a:srgbClr val="000000"/>
               </a:solidFill>
@@ -6764,7 +6806,7 @@
           <a:lstStyle/>
           <a:p>
             <a:r>
-              <a:rPr lang="pt-BR" sz="2800" b="1" dirty="0"/>
+              <a:rPr lang="pt-BR" sz="2800" b="1"/>
               <a:t>Primeiro criamos a Classe </a:t>
             </a:r>
             <a:r>
@@ -6816,7 +6858,7 @@
               <a:t>class</a:t>
             </a:r>
             <a:r>
-              <a:rPr lang="pt-BR" sz="2400" dirty="0">
+              <a:rPr lang="pt-BR" sz="2400">
                 <a:solidFill>
                   <a:srgbClr val="CCCCCC"/>
                 </a:solidFill>
@@ -6834,7 +6876,7 @@
               <a:t>Heroi</a:t>
             </a:r>
             <a:r>
-              <a:rPr lang="pt-BR" sz="2400" dirty="0">
+              <a:rPr lang="pt-BR" sz="2400">
                 <a:solidFill>
                   <a:srgbClr val="CCCCCC"/>
                 </a:solidFill>
@@ -6848,7 +6890,7 @@
           </a:p>
           <a:p>
             <a:r>
-              <a:rPr lang="pt-BR" sz="2400" dirty="0">
+              <a:rPr lang="pt-BR" sz="2400">
                 <a:solidFill>
                   <a:srgbClr val="CCCCCC"/>
                 </a:solidFill>
@@ -6866,7 +6908,7 @@
               <a:t>def</a:t>
             </a:r>
             <a:r>
-              <a:rPr lang="pt-BR" sz="2400" dirty="0">
+              <a:rPr lang="pt-BR" sz="2400">
                 <a:solidFill>
                   <a:srgbClr val="CCCCCC"/>
                 </a:solidFill>
@@ -6875,7 +6917,7 @@
               <a:t> </a:t>
             </a:r>
             <a:r>
-              <a:rPr lang="pt-BR" sz="2400" dirty="0">
+              <a:rPr lang="pt-BR" sz="2400">
                 <a:solidFill>
                   <a:srgbClr val="DCDCAA"/>
                 </a:solidFill>
@@ -6893,7 +6935,7 @@
               <a:t>init</a:t>
             </a:r>
             <a:r>
-              <a:rPr lang="pt-BR" sz="2400" dirty="0">
+              <a:rPr lang="pt-BR" sz="2400">
                 <a:solidFill>
                   <a:srgbClr val="DCDCAA"/>
                 </a:solidFill>
@@ -6902,7 +6944,7 @@
               <a:t>__</a:t>
             </a:r>
             <a:r>
-              <a:rPr lang="pt-BR" sz="2400" dirty="0">
+              <a:rPr lang="pt-BR" sz="2400">
                 <a:solidFill>
                   <a:srgbClr val="CCCCCC"/>
                 </a:solidFill>
@@ -6956,7 +6998,7 @@
               <a:t>ataque</a:t>
             </a:r>
             <a:r>
-              <a:rPr lang="pt-BR" sz="2400" dirty="0">
+              <a:rPr lang="pt-BR" sz="2400">
                 <a:solidFill>
                   <a:srgbClr val="CCCCCC"/>
                 </a:solidFill>
@@ -6965,7 +7007,7 @@
               <a:t> </a:t>
             </a:r>
             <a:r>
-              <a:rPr lang="pt-BR" sz="2400" dirty="0">
+              <a:rPr lang="pt-BR" sz="2400">
                 <a:solidFill>
                   <a:srgbClr val="D4D4D4"/>
                 </a:solidFill>
@@ -6974,7 +7016,7 @@
               <a:t>=</a:t>
             </a:r>
             <a:r>
-              <a:rPr lang="pt-BR" sz="2400" dirty="0">
+              <a:rPr lang="pt-BR" sz="2400">
                 <a:solidFill>
                   <a:srgbClr val="CCCCCC"/>
                 </a:solidFill>
@@ -6983,7 +7025,7 @@
               <a:t> </a:t>
             </a:r>
             <a:r>
-              <a:rPr lang="pt-BR" sz="2400" dirty="0">
+              <a:rPr lang="pt-BR" sz="2400">
                 <a:solidFill>
                   <a:srgbClr val="B5CEA8"/>
                 </a:solidFill>
@@ -6992,7 +7034,7 @@
               <a:t>10</a:t>
             </a:r>
             <a:r>
-              <a:rPr lang="pt-BR" sz="2400" dirty="0">
+              <a:rPr lang="pt-BR" sz="2400">
                 <a:solidFill>
                   <a:srgbClr val="CCCCCC"/>
                 </a:solidFill>
@@ -7001,7 +7043,7 @@
               <a:t>,</a:t>
             </a:r>
             <a:r>
-              <a:rPr lang="pt-BR" sz="2400" dirty="0">
+              <a:rPr lang="pt-BR" sz="2400">
                 <a:solidFill>
                   <a:srgbClr val="9CDCFE"/>
                 </a:solidFill>
@@ -7010,7 +7052,7 @@
               <a:t>life</a:t>
             </a:r>
             <a:r>
-              <a:rPr lang="pt-BR" sz="2400" dirty="0">
+              <a:rPr lang="pt-BR" sz="2400">
                 <a:solidFill>
                   <a:srgbClr val="CCCCCC"/>
                 </a:solidFill>
@@ -7019,7 +7061,7 @@
               <a:t> </a:t>
             </a:r>
             <a:r>
-              <a:rPr lang="pt-BR" sz="2400" dirty="0">
+              <a:rPr lang="pt-BR" sz="2400">
                 <a:solidFill>
                   <a:srgbClr val="D4D4D4"/>
                 </a:solidFill>
@@ -7028,7 +7070,7 @@
               <a:t>=</a:t>
             </a:r>
             <a:r>
-              <a:rPr lang="pt-BR" sz="2400" dirty="0">
+              <a:rPr lang="pt-BR" sz="2400">
                 <a:solidFill>
                   <a:srgbClr val="CCCCCC"/>
                 </a:solidFill>
@@ -7037,7 +7079,7 @@
               <a:t> </a:t>
             </a:r>
             <a:r>
-              <a:rPr lang="pt-BR" sz="2400" dirty="0">
+              <a:rPr lang="pt-BR" sz="2400">
                 <a:solidFill>
                   <a:srgbClr val="B5CEA8"/>
                 </a:solidFill>
@@ -7046,7 +7088,7 @@
               <a:t>100</a:t>
             </a:r>
             <a:r>
-              <a:rPr lang="pt-BR" sz="2400" dirty="0">
+              <a:rPr lang="pt-BR" sz="2400">
                 <a:solidFill>
                   <a:srgbClr val="CCCCCC"/>
                 </a:solidFill>
@@ -7064,7 +7106,7 @@
               <a:t>islive</a:t>
             </a:r>
             <a:r>
-              <a:rPr lang="pt-BR" sz="2400" dirty="0">
+              <a:rPr lang="pt-BR" sz="2400">
                 <a:solidFill>
                   <a:srgbClr val="CCCCCC"/>
                 </a:solidFill>
@@ -7073,7 +7115,7 @@
               <a:t> </a:t>
             </a:r>
             <a:r>
-              <a:rPr lang="pt-BR" sz="2400" dirty="0">
+              <a:rPr lang="pt-BR" sz="2400">
                 <a:solidFill>
                   <a:srgbClr val="D4D4D4"/>
                 </a:solidFill>
@@ -7082,7 +7124,7 @@
               <a:t>=</a:t>
             </a:r>
             <a:r>
-              <a:rPr lang="pt-BR" sz="2400" dirty="0">
+              <a:rPr lang="pt-BR" sz="2400">
                 <a:solidFill>
                   <a:srgbClr val="CCCCCC"/>
                 </a:solidFill>
@@ -7100,7 +7142,7 @@
               <a:t>True</a:t>
             </a:r>
             <a:r>
-              <a:rPr lang="pt-BR" sz="2400" dirty="0">
+              <a:rPr lang="pt-BR" sz="2400">
                 <a:solidFill>
                   <a:srgbClr val="CCCCCC"/>
                 </a:solidFill>
@@ -7118,7 +7160,7 @@
               <a:t>None</a:t>
             </a:r>
             <a:r>
-              <a:rPr lang="pt-BR" sz="2400" dirty="0">
+              <a:rPr lang="pt-BR" sz="2400">
                 <a:solidFill>
                   <a:srgbClr val="CCCCCC"/>
                 </a:solidFill>
@@ -7132,7 +7174,7 @@
           </a:p>
           <a:p>
             <a:r>
-              <a:rPr lang="pt-BR" sz="2400" dirty="0">
+              <a:rPr lang="pt-BR" sz="2400">
                 <a:solidFill>
                   <a:srgbClr val="CCCCCC"/>
                 </a:solidFill>
@@ -7168,7 +7210,7 @@
               <a:t>nome</a:t>
             </a:r>
             <a:r>
-              <a:rPr lang="pt-BR" sz="2400" dirty="0">
+              <a:rPr lang="pt-BR" sz="2400">
                 <a:solidFill>
                   <a:srgbClr val="CCCCCC"/>
                 </a:solidFill>
@@ -7177,7 +7219,7 @@
               <a:t> </a:t>
             </a:r>
             <a:r>
-              <a:rPr lang="pt-BR" sz="2400" dirty="0">
+              <a:rPr lang="pt-BR" sz="2400">
                 <a:solidFill>
                   <a:srgbClr val="D4D4D4"/>
                 </a:solidFill>
@@ -7186,7 +7228,7 @@
               <a:t>=</a:t>
             </a:r>
             <a:r>
-              <a:rPr lang="pt-BR" sz="2400" dirty="0">
+              <a:rPr lang="pt-BR" sz="2400">
                 <a:solidFill>
                   <a:srgbClr val="CCCCCC"/>
                 </a:solidFill>
@@ -7195,7 +7237,7 @@
               <a:t> </a:t>
             </a:r>
             <a:r>
-              <a:rPr lang="pt-BR" sz="2400" dirty="0">
+              <a:rPr lang="pt-BR" sz="2400">
                 <a:solidFill>
                   <a:srgbClr val="9CDCFE"/>
                 </a:solidFill>
@@ -7203,16 +7245,10 @@
               </a:rPr>
               <a:t>nome</a:t>
             </a:r>
-            <a:endParaRPr lang="pt-BR" sz="2400">
-              <a:solidFill>
-                <a:srgbClr val="9CDCFE"/>
-              </a:solidFill>
-              <a:latin typeface="Calibri"/>
-            </a:endParaRPr>
-          </a:p>
-          <a:p>
-            <a:r>
-              <a:rPr lang="pt-BR" sz="2400" dirty="0">
+          </a:p>
+          <a:p>
+            <a:r>
+              <a:rPr lang="pt-BR" sz="2400">
                 <a:solidFill>
                   <a:srgbClr val="CCCCCC"/>
                 </a:solidFill>
@@ -7248,7 +7284,7 @@
               <a:t>ataque</a:t>
             </a:r>
             <a:r>
-              <a:rPr lang="pt-BR" sz="2400" dirty="0">
+              <a:rPr lang="pt-BR" sz="2400">
                 <a:solidFill>
                   <a:srgbClr val="CCCCCC"/>
                 </a:solidFill>
@@ -7257,7 +7293,7 @@
               <a:t> </a:t>
             </a:r>
             <a:r>
-              <a:rPr lang="pt-BR" sz="2400" dirty="0">
+              <a:rPr lang="pt-BR" sz="2400">
                 <a:solidFill>
                   <a:srgbClr val="D4D4D4"/>
                 </a:solidFill>
@@ -7266,7 +7302,7 @@
               <a:t>=</a:t>
             </a:r>
             <a:r>
-              <a:rPr lang="pt-BR" sz="2400" dirty="0">
+              <a:rPr lang="pt-BR" sz="2400">
                 <a:solidFill>
                   <a:srgbClr val="CCCCCC"/>
                 </a:solidFill>
@@ -7275,7 +7311,7 @@
               <a:t> </a:t>
             </a:r>
             <a:r>
-              <a:rPr lang="pt-BR" sz="2400" dirty="0">
+              <a:rPr lang="pt-BR" sz="2400">
                 <a:solidFill>
                   <a:srgbClr val="9CDCFE"/>
                 </a:solidFill>
@@ -7289,7 +7325,7 @@
           </a:p>
           <a:p>
             <a:r>
-              <a:rPr lang="pt-BR" sz="2400" dirty="0">
+              <a:rPr lang="pt-BR" sz="2400">
                 <a:solidFill>
                   <a:srgbClr val="CCCCCC"/>
                 </a:solidFill>
@@ -7325,7 +7361,7 @@
               <a:t>life</a:t>
             </a:r>
             <a:r>
-              <a:rPr lang="pt-BR" sz="2400" dirty="0">
+              <a:rPr lang="pt-BR" sz="2400">
                 <a:solidFill>
                   <a:srgbClr val="CCCCCC"/>
                 </a:solidFill>
@@ -7334,7 +7370,7 @@
               <a:t> </a:t>
             </a:r>
             <a:r>
-              <a:rPr lang="pt-BR" sz="2400" dirty="0">
+              <a:rPr lang="pt-BR" sz="2400">
                 <a:solidFill>
                   <a:srgbClr val="D4D4D4"/>
                 </a:solidFill>
@@ -7343,7 +7379,7 @@
               <a:t>=</a:t>
             </a:r>
             <a:r>
-              <a:rPr lang="pt-BR" sz="2400" dirty="0">
+              <a:rPr lang="pt-BR" sz="2400">
                 <a:solidFill>
                   <a:srgbClr val="CCCCCC"/>
                 </a:solidFill>
@@ -7366,7 +7402,7 @@
           </a:p>
           <a:p>
             <a:r>
-              <a:rPr lang="pt-BR" sz="2400" dirty="0">
+              <a:rPr lang="pt-BR" sz="2400">
                 <a:solidFill>
                   <a:srgbClr val="CCCCCC"/>
                 </a:solidFill>
@@ -7402,7 +7438,7 @@
               <a:t>islive</a:t>
             </a:r>
             <a:r>
-              <a:rPr lang="pt-BR" sz="2400" dirty="0">
+              <a:rPr lang="pt-BR" sz="2400">
                 <a:solidFill>
                   <a:srgbClr val="CCCCCC"/>
                 </a:solidFill>
@@ -7411,7 +7447,7 @@
               <a:t> </a:t>
             </a:r>
             <a:r>
-              <a:rPr lang="pt-BR" sz="2400" dirty="0">
+              <a:rPr lang="pt-BR" sz="2400">
                 <a:solidFill>
                   <a:srgbClr val="D4D4D4"/>
                 </a:solidFill>
@@ -7420,7 +7456,7 @@
               <a:t>=</a:t>
             </a:r>
             <a:r>
-              <a:rPr lang="pt-BR" sz="2400" dirty="0">
+              <a:rPr lang="pt-BR" sz="2400">
                 <a:solidFill>
                   <a:srgbClr val="CCCCCC"/>
                 </a:solidFill>
@@ -7443,7 +7479,7 @@
           </a:p>
           <a:p>
             <a:pPr algn="l"/>
-            <a:endParaRPr lang="pt-BR" dirty="0"/>
+            <a:endParaRPr lang="pt-BR"/>
           </a:p>
         </p:txBody>
       </p:sp>
@@ -7622,7 +7658,7 @@
                 <a:spcPts val="99"/>
               </a:spcBef>
             </a:pPr>
-            <a:endParaRPr lang="pt-BR" sz="3200" spc="-1" dirty="0">
+            <a:endParaRPr lang="pt-BR" sz="3200" spc="-1">
               <a:solidFill>
                 <a:srgbClr val="000000"/>
               </a:solidFill>
@@ -7713,7 +7749,7 @@
           <a:lstStyle/>
           <a:p>
             <a:r>
-              <a:rPr lang="pt-BR" sz="2800" b="1" dirty="0"/>
+              <a:rPr lang="pt-BR" sz="2800" b="1"/>
               <a:t>Criamos os métodos, ataque e dano</a:t>
             </a:r>
           </a:p>
@@ -7751,7 +7787,7 @@
           <a:lstStyle/>
           <a:p>
             <a:r>
-              <a:rPr lang="pt-BR" sz="2400" dirty="0" err="1">
+              <a:rPr lang="pt-BR" sz="2400" err="1">
                 <a:solidFill>
                   <a:srgbClr val="569CD6"/>
                 </a:solidFill>
@@ -7760,7 +7796,7 @@
               <a:t>def</a:t>
             </a:r>
             <a:r>
-              <a:rPr lang="pt-BR" sz="2400" dirty="0">
+              <a:rPr lang="pt-BR" sz="2400">
                 <a:solidFill>
                   <a:srgbClr val="CCCCCC"/>
                 </a:solidFill>
@@ -7769,7 +7805,7 @@
               <a:t> </a:t>
             </a:r>
             <a:r>
-              <a:rPr lang="pt-BR" sz="2400" dirty="0">
+              <a:rPr lang="pt-BR" sz="2400">
                 <a:solidFill>
                   <a:srgbClr val="DCDCAA"/>
                 </a:solidFill>
@@ -7778,7 +7814,7 @@
               <a:t>ataca</a:t>
             </a:r>
             <a:r>
-              <a:rPr lang="pt-BR" sz="2400" dirty="0">
+              <a:rPr lang="pt-BR" sz="2400">
                 <a:solidFill>
                   <a:srgbClr val="CCCCCC"/>
                 </a:solidFill>
@@ -7787,7 +7823,7 @@
               <a:t>(</a:t>
             </a:r>
             <a:r>
-              <a:rPr lang="pt-BR" sz="2400" dirty="0" err="1">
+              <a:rPr lang="pt-BR" sz="2400" err="1">
                 <a:solidFill>
                   <a:srgbClr val="9CDCFE"/>
                 </a:solidFill>
@@ -7796,7 +7832,7 @@
               <a:t>self</a:t>
             </a:r>
             <a:r>
-              <a:rPr lang="pt-BR" sz="2400" dirty="0" err="1">
+              <a:rPr lang="pt-BR" sz="2400" err="1">
                 <a:solidFill>
                   <a:srgbClr val="CCCCCC"/>
                 </a:solidFill>
@@ -7805,7 +7841,7 @@
               <a:t>,</a:t>
             </a:r>
             <a:r>
-              <a:rPr lang="pt-BR" sz="2400" dirty="0" err="1">
+              <a:rPr lang="pt-BR" sz="2400" err="1">
                 <a:solidFill>
                   <a:srgbClr val="9CDCFE"/>
                 </a:solidFill>
@@ -7814,7 +7850,7 @@
               <a:t>inimigo</a:t>
             </a:r>
             <a:r>
-              <a:rPr lang="pt-BR" sz="2400" dirty="0">
+              <a:rPr lang="pt-BR" sz="2400">
                 <a:solidFill>
                   <a:srgbClr val="CCCCCC"/>
                 </a:solidFill>
@@ -7822,13 +7858,13 @@
               </a:rPr>
               <a:t>):</a:t>
             </a:r>
-            <a:endParaRPr lang="pt-BR" sz="2400" dirty="0">
+            <a:endParaRPr lang="pt-BR" sz="2400">
               <a:latin typeface="Calibri"/>
             </a:endParaRPr>
           </a:p>
           <a:p>
             <a:r>
-              <a:rPr lang="pt-BR" sz="2400" dirty="0">
+              <a:rPr lang="pt-BR" sz="2400">
                 <a:solidFill>
                   <a:srgbClr val="CCCCCC"/>
                 </a:solidFill>
@@ -7837,7 +7873,7 @@
               <a:t>        </a:t>
             </a:r>
             <a:r>
-              <a:rPr lang="pt-BR" sz="2400" dirty="0">
+              <a:rPr lang="pt-BR" sz="2400">
                 <a:solidFill>
                   <a:srgbClr val="DCDCAA"/>
                 </a:solidFill>
@@ -7846,7 +7882,7 @@
               <a:t>print</a:t>
             </a:r>
             <a:r>
-              <a:rPr lang="pt-BR" sz="2400" dirty="0">
+              <a:rPr lang="pt-BR" sz="2400">
                 <a:solidFill>
                   <a:srgbClr val="CCCCCC"/>
                 </a:solidFill>
@@ -7855,7 +7891,7 @@
               <a:t>(</a:t>
             </a:r>
             <a:r>
-              <a:rPr lang="pt-BR" sz="2400" dirty="0">
+              <a:rPr lang="pt-BR" sz="2400">
                 <a:solidFill>
                   <a:srgbClr val="CE9178"/>
                 </a:solidFill>
@@ -7864,7 +7900,7 @@
               <a:t>'</a:t>
             </a:r>
             <a:r>
-              <a:rPr lang="pt-BR" sz="2400" dirty="0">
+              <a:rPr lang="pt-BR" sz="2400">
                 <a:solidFill>
                   <a:srgbClr val="569CD6"/>
                 </a:solidFill>
@@ -7873,7 +7909,7 @@
               <a:t>%s</a:t>
             </a:r>
             <a:r>
-              <a:rPr lang="pt-BR" sz="2400" dirty="0">
+              <a:rPr lang="pt-BR" sz="2400">
                 <a:solidFill>
                   <a:srgbClr val="CE9178"/>
                 </a:solidFill>
@@ -7882,7 +7918,7 @@
               <a:t> atacou </a:t>
             </a:r>
             <a:r>
-              <a:rPr lang="pt-BR" sz="2400" dirty="0">
+              <a:rPr lang="pt-BR" sz="2400">
                 <a:solidFill>
                   <a:srgbClr val="569CD6"/>
                 </a:solidFill>
@@ -7891,7 +7927,7 @@
               <a:t>%s</a:t>
             </a:r>
             <a:r>
-              <a:rPr lang="pt-BR" sz="2400" dirty="0">
+              <a:rPr lang="pt-BR" sz="2400">
                 <a:solidFill>
                   <a:srgbClr val="CE9178"/>
                 </a:solidFill>
@@ -7900,7 +7936,7 @@
               <a:t>'</a:t>
             </a:r>
             <a:r>
-              <a:rPr lang="pt-BR" sz="2400" dirty="0">
+              <a:rPr lang="pt-BR" sz="2400">
                 <a:solidFill>
                   <a:srgbClr val="CCCCCC"/>
                 </a:solidFill>
@@ -7909,7 +7945,7 @@
               <a:t> </a:t>
             </a:r>
             <a:r>
-              <a:rPr lang="pt-BR" sz="2400" dirty="0">
+              <a:rPr lang="pt-BR" sz="2400">
                 <a:solidFill>
                   <a:srgbClr val="D4D4D4"/>
                 </a:solidFill>
@@ -7918,7 +7954,7 @@
               <a:t>%</a:t>
             </a:r>
             <a:r>
-              <a:rPr lang="pt-BR" sz="2400" dirty="0">
+              <a:rPr lang="pt-BR" sz="2400">
                 <a:solidFill>
                   <a:srgbClr val="CCCCCC"/>
                 </a:solidFill>
@@ -7927,7 +7963,7 @@
               <a:t> (</a:t>
             </a:r>
             <a:r>
-              <a:rPr lang="pt-BR" sz="2400" dirty="0" err="1">
+              <a:rPr lang="pt-BR" sz="2400" err="1">
                 <a:solidFill>
                   <a:srgbClr val="9CDCFE"/>
                 </a:solidFill>
@@ -7936,7 +7972,7 @@
               <a:t>self</a:t>
             </a:r>
             <a:r>
-              <a:rPr lang="pt-BR" sz="2400" dirty="0" err="1">
+              <a:rPr lang="pt-BR" sz="2400" err="1">
                 <a:solidFill>
                   <a:srgbClr val="CCCCCC"/>
                 </a:solidFill>
@@ -7945,7 +7981,7 @@
               <a:t>.</a:t>
             </a:r>
             <a:r>
-              <a:rPr lang="pt-BR" sz="2400" dirty="0" err="1">
+              <a:rPr lang="pt-BR" sz="2400" err="1">
                 <a:solidFill>
                   <a:srgbClr val="9CDCFE"/>
                 </a:solidFill>
@@ -7954,7 +7990,7 @@
               <a:t>nome</a:t>
             </a:r>
             <a:r>
-              <a:rPr lang="pt-BR" sz="2400" dirty="0" err="1">
+              <a:rPr lang="pt-BR" sz="2400" err="1">
                 <a:solidFill>
                   <a:srgbClr val="CCCCCC"/>
                 </a:solidFill>
@@ -7963,7 +7999,7 @@
               <a:t>,</a:t>
             </a:r>
             <a:r>
-              <a:rPr lang="pt-BR" sz="2400" dirty="0" err="1">
+              <a:rPr lang="pt-BR" sz="2400" err="1">
                 <a:solidFill>
                   <a:srgbClr val="9CDCFE"/>
                 </a:solidFill>
@@ -7972,7 +8008,7 @@
               <a:t>inimigo</a:t>
             </a:r>
             <a:r>
-              <a:rPr lang="pt-BR" sz="2400" dirty="0" err="1">
+              <a:rPr lang="pt-BR" sz="2400" err="1">
                 <a:solidFill>
                   <a:srgbClr val="CCCCCC"/>
                 </a:solidFill>
@@ -7981,7 +8017,7 @@
               <a:t>.nome</a:t>
             </a:r>
             <a:r>
-              <a:rPr lang="pt-BR" sz="2400" dirty="0">
+              <a:rPr lang="pt-BR" sz="2400">
                 <a:solidFill>
                   <a:srgbClr val="CCCCCC"/>
                 </a:solidFill>
@@ -7989,11 +8025,11 @@
               </a:rPr>
               <a:t>))</a:t>
             </a:r>
-            <a:endParaRPr lang="en-US" dirty="0"/>
-          </a:p>
-          <a:p>
-            <a:r>
-              <a:rPr lang="pt-BR" sz="2400" dirty="0">
+            <a:endParaRPr lang="en-US"/>
+          </a:p>
+          <a:p>
+            <a:r>
+              <a:rPr lang="pt-BR" sz="2400">
                 <a:solidFill>
                   <a:srgbClr val="CCCCCC"/>
                 </a:solidFill>
@@ -8029,7 +8065,7 @@
               <a:t>sleep</a:t>
             </a:r>
             <a:r>
-              <a:rPr lang="pt-BR" sz="2400" dirty="0">
+              <a:rPr lang="pt-BR" sz="2400">
                 <a:solidFill>
                   <a:srgbClr val="CCCCCC"/>
                 </a:solidFill>
@@ -8038,7 +8074,7 @@
               <a:t>(</a:t>
             </a:r>
             <a:r>
-              <a:rPr lang="pt-BR" sz="2400" dirty="0">
+              <a:rPr lang="pt-BR" sz="2400">
                 <a:solidFill>
                   <a:srgbClr val="B5CEA8"/>
                 </a:solidFill>
@@ -8047,7 +8083,7 @@
               <a:t>1</a:t>
             </a:r>
             <a:r>
-              <a:rPr lang="pt-BR" sz="2400" dirty="0">
+              <a:rPr lang="pt-BR" sz="2400">
                 <a:solidFill>
                   <a:srgbClr val="CCCCCC"/>
                 </a:solidFill>
@@ -8061,7 +8097,7 @@
           </a:p>
           <a:p>
             <a:r>
-              <a:rPr lang="pt-BR" sz="2400" dirty="0">
+              <a:rPr lang="pt-BR" sz="2400">
                 <a:solidFill>
                   <a:srgbClr val="CCCCCC"/>
                 </a:solidFill>
@@ -8088,7 +8124,7 @@
               <a:t>.dano</a:t>
             </a:r>
             <a:r>
-              <a:rPr lang="pt-BR" sz="2400" dirty="0">
+              <a:rPr lang="pt-BR" sz="2400">
                 <a:solidFill>
                   <a:srgbClr val="CCCCCC"/>
                 </a:solidFill>
@@ -8124,7 +8160,7 @@
               <a:t>ataque</a:t>
             </a:r>
             <a:r>
-              <a:rPr lang="pt-BR" sz="2400" dirty="0">
+              <a:rPr lang="pt-BR" sz="2400">
                 <a:solidFill>
                   <a:srgbClr val="CCCCCC"/>
                 </a:solidFill>
@@ -8133,7 +8169,7 @@
               <a:t>) </a:t>
             </a:r>
             <a:r>
-              <a:rPr lang="pt-BR" sz="2400" dirty="0">
+              <a:rPr lang="pt-BR" sz="2400">
                 <a:solidFill>
                   <a:srgbClr val="6A9955"/>
                 </a:solidFill>
@@ -8147,7 +8183,7 @@
           </a:p>
           <a:p>
             <a:r>
-              <a:rPr lang="pt-BR" sz="2400" dirty="0">
+              <a:rPr lang="pt-BR" sz="2400">
                 <a:solidFill>
                   <a:srgbClr val="CCCCCC"/>
                 </a:solidFill>
@@ -8174,7 +8210,7 @@
               <a:t>.tem_Vida</a:t>
             </a:r>
             <a:r>
-              <a:rPr lang="pt-BR" sz="2400" dirty="0">
+              <a:rPr lang="pt-BR" sz="2400">
                 <a:solidFill>
                   <a:srgbClr val="CCCCCC"/>
                 </a:solidFill>
@@ -8188,7 +8224,7 @@
           </a:p>
           <a:p>
             <a:br>
-              <a:rPr lang="en-US" dirty="0"/>
+              <a:rPr lang="en-US"/>
             </a:br>
             <a:endParaRPr lang="en-US" sz="2400">
               <a:latin typeface="Calibri"/>
@@ -8196,7 +8232,7 @@
           </a:p>
           <a:p>
             <a:r>
-              <a:rPr lang="pt-BR" sz="2400" dirty="0" err="1">
+              <a:rPr lang="pt-BR" sz="2400" err="1">
                 <a:solidFill>
                   <a:srgbClr val="569CD6"/>
                 </a:solidFill>
@@ -8205,7 +8241,7 @@
               <a:t>def</a:t>
             </a:r>
             <a:r>
-              <a:rPr lang="pt-BR" sz="2400" dirty="0">
+              <a:rPr lang="pt-BR" sz="2400">
                 <a:solidFill>
                   <a:srgbClr val="CCCCCC"/>
                 </a:solidFill>
@@ -8214,7 +8250,7 @@
               <a:t> </a:t>
             </a:r>
             <a:r>
-              <a:rPr lang="pt-BR" sz="2400" dirty="0">
+              <a:rPr lang="pt-BR" sz="2400">
                 <a:solidFill>
                   <a:srgbClr val="DCDCAA"/>
                 </a:solidFill>
@@ -8223,7 +8259,7 @@
               <a:t>dano</a:t>
             </a:r>
             <a:r>
-              <a:rPr lang="pt-BR" sz="2400" dirty="0">
+              <a:rPr lang="pt-BR" sz="2400">
                 <a:solidFill>
                   <a:srgbClr val="CCCCCC"/>
                 </a:solidFill>
@@ -8232,7 +8268,7 @@
               <a:t>(</a:t>
             </a:r>
             <a:r>
-              <a:rPr lang="pt-BR" sz="2400" dirty="0" err="1">
+              <a:rPr lang="pt-BR" sz="2400" err="1">
                 <a:solidFill>
                   <a:srgbClr val="9CDCFE"/>
                 </a:solidFill>
@@ -8241,7 +8277,7 @@
               <a:t>self</a:t>
             </a:r>
             <a:r>
-              <a:rPr lang="pt-BR" sz="2400" dirty="0" err="1">
+              <a:rPr lang="pt-BR" sz="2400" err="1">
                 <a:solidFill>
                   <a:srgbClr val="CCCCCC"/>
                 </a:solidFill>
@@ -8250,7 +8286,7 @@
               <a:t>,</a:t>
             </a:r>
             <a:r>
-              <a:rPr lang="pt-BR" sz="2400" dirty="0" err="1">
+              <a:rPr lang="pt-BR" sz="2400" err="1">
                 <a:solidFill>
                   <a:srgbClr val="9CDCFE"/>
                 </a:solidFill>
@@ -8259,7 +8295,7 @@
               <a:t>dano</a:t>
             </a:r>
             <a:r>
-              <a:rPr lang="pt-BR" sz="2400" dirty="0">
+              <a:rPr lang="pt-BR" sz="2400">
                 <a:solidFill>
                   <a:srgbClr val="CCCCCC"/>
                 </a:solidFill>
@@ -8273,7 +8309,7 @@
           </a:p>
           <a:p>
             <a:r>
-              <a:rPr lang="pt-BR" sz="2400" dirty="0">
+              <a:rPr lang="pt-BR" sz="2400">
                 <a:solidFill>
                   <a:srgbClr val="CCCCCC"/>
                 </a:solidFill>
@@ -8309,7 +8345,7 @@
               <a:t>vida</a:t>
             </a:r>
             <a:r>
-              <a:rPr lang="pt-BR" sz="2400" dirty="0">
+              <a:rPr lang="pt-BR" sz="2400">
                 <a:solidFill>
                   <a:srgbClr val="D4D4D4"/>
                 </a:solidFill>
@@ -8318,7 +8354,7 @@
               <a:t>-=</a:t>
             </a:r>
             <a:r>
-              <a:rPr lang="pt-BR" sz="2400" dirty="0">
+              <a:rPr lang="pt-BR" sz="2400">
                 <a:solidFill>
                   <a:srgbClr val="CCCCCC"/>
                 </a:solidFill>
@@ -8327,7 +8363,7 @@
               <a:t> </a:t>
             </a:r>
             <a:r>
-              <a:rPr lang="pt-BR" sz="2400" dirty="0">
+              <a:rPr lang="pt-BR" sz="2400">
                 <a:solidFill>
                   <a:srgbClr val="9CDCFE"/>
                 </a:solidFill>
@@ -8341,7 +8377,7 @@
           </a:p>
           <a:p>
             <a:r>
-              <a:rPr lang="pt-BR" sz="2400" dirty="0">
+              <a:rPr lang="pt-BR" sz="2400">
                 <a:solidFill>
                   <a:srgbClr val="CCCCCC"/>
                 </a:solidFill>
@@ -8350,7 +8386,7 @@
               <a:t>        </a:t>
             </a:r>
             <a:r>
-              <a:rPr lang="pt-BR" sz="2400" dirty="0">
+              <a:rPr lang="pt-BR" sz="2400">
                 <a:solidFill>
                   <a:srgbClr val="DCDCAA"/>
                 </a:solidFill>
@@ -8359,7 +8395,7 @@
               <a:t>print</a:t>
             </a:r>
             <a:r>
-              <a:rPr lang="pt-BR" sz="2400" dirty="0">
+              <a:rPr lang="pt-BR" sz="2400">
                 <a:solidFill>
                   <a:srgbClr val="CCCCCC"/>
                 </a:solidFill>
@@ -8368,7 +8404,7 @@
               <a:t>(</a:t>
             </a:r>
             <a:r>
-              <a:rPr lang="pt-BR" sz="2400" dirty="0">
+              <a:rPr lang="pt-BR" sz="2400">
                 <a:solidFill>
                   <a:srgbClr val="CE9178"/>
                 </a:solidFill>
@@ -8377,7 +8413,7 @@
               <a:t>'</a:t>
             </a:r>
             <a:r>
-              <a:rPr lang="pt-BR" sz="2400" dirty="0">
+              <a:rPr lang="pt-BR" sz="2400">
                 <a:solidFill>
                   <a:srgbClr val="569CD6"/>
                 </a:solidFill>
@@ -8386,7 +8422,7 @@
               <a:t>%s</a:t>
             </a:r>
             <a:r>
-              <a:rPr lang="pt-BR" sz="2400" dirty="0">
+              <a:rPr lang="pt-BR" sz="2400">
                 <a:solidFill>
                   <a:srgbClr val="CE9178"/>
                 </a:solidFill>
@@ -8395,7 +8431,7 @@
               <a:t> recebeu </a:t>
             </a:r>
             <a:r>
-              <a:rPr lang="pt-BR" sz="2400" dirty="0">
+              <a:rPr lang="pt-BR" sz="2400">
                 <a:solidFill>
                   <a:srgbClr val="569CD6"/>
                 </a:solidFill>
@@ -8404,7 +8440,7 @@
               <a:t>%i</a:t>
             </a:r>
             <a:r>
-              <a:rPr lang="pt-BR" sz="2400" dirty="0">
+              <a:rPr lang="pt-BR" sz="2400">
                 <a:solidFill>
                   <a:srgbClr val="CE9178"/>
                 </a:solidFill>
@@ -8413,7 +8449,7 @@
               <a:t> de dano'</a:t>
             </a:r>
             <a:r>
-              <a:rPr lang="pt-BR" sz="2400" dirty="0">
+              <a:rPr lang="pt-BR" sz="2400">
                 <a:solidFill>
                   <a:srgbClr val="CCCCCC"/>
                 </a:solidFill>
@@ -8422,7 +8458,7 @@
               <a:t> </a:t>
             </a:r>
             <a:r>
-              <a:rPr lang="pt-BR" sz="2400" dirty="0">
+              <a:rPr lang="pt-BR" sz="2400">
                 <a:solidFill>
                   <a:srgbClr val="D4D4D4"/>
                 </a:solidFill>
@@ -8431,7 +8467,7 @@
               <a:t>%</a:t>
             </a:r>
             <a:r>
-              <a:rPr lang="pt-BR" sz="2400" dirty="0">
+              <a:rPr lang="pt-BR" sz="2400">
                 <a:solidFill>
                   <a:srgbClr val="CCCCCC"/>
                 </a:solidFill>
@@ -8467,7 +8503,7 @@
               <a:t>nome</a:t>
             </a:r>
             <a:r>
-              <a:rPr lang="pt-BR" sz="2400" dirty="0">
+              <a:rPr lang="pt-BR" sz="2400">
                 <a:solidFill>
                   <a:srgbClr val="CCCCCC"/>
                 </a:solidFill>
@@ -8476,7 +8512,7 @@
               <a:t>, </a:t>
             </a:r>
             <a:r>
-              <a:rPr lang="pt-BR" sz="2400" dirty="0">
+              <a:rPr lang="pt-BR" sz="2400">
                 <a:solidFill>
                   <a:srgbClr val="9CDCFE"/>
                 </a:solidFill>
@@ -8485,7 +8521,7 @@
               <a:t>dano</a:t>
             </a:r>
             <a:r>
-              <a:rPr lang="pt-BR" sz="2400" dirty="0">
+              <a:rPr lang="pt-BR" sz="2400">
                 <a:solidFill>
                   <a:srgbClr val="CCCCCC"/>
                 </a:solidFill>
@@ -8498,7 +8534,7 @@
             </a:endParaRPr>
           </a:p>
           <a:p>
-            <a:endParaRPr lang="pt-BR" sz="2400" dirty="0">
+            <a:endParaRPr lang="pt-BR" sz="2400">
               <a:solidFill>
                 <a:srgbClr val="CCCCCC"/>
               </a:solidFill>
@@ -8506,7 +8542,7 @@
             </a:endParaRPr>
           </a:p>
           <a:p>
-            <a:endParaRPr lang="pt-BR" sz="2400" dirty="0">
+            <a:endParaRPr lang="pt-BR" sz="2400">
               <a:solidFill>
                 <a:srgbClr val="CCCCCC"/>
               </a:solidFill>
@@ -8695,7 +8731,7 @@
                 <a:spcPts val="99"/>
               </a:spcBef>
             </a:pPr>
-            <a:endParaRPr lang="pt-BR" sz="3200" spc="-1" dirty="0">
+            <a:endParaRPr lang="pt-BR" sz="3200" spc="-1">
               <a:solidFill>
                 <a:srgbClr val="000000"/>
               </a:solidFill>
@@ -8786,15 +8822,15 @@
           <a:lstStyle/>
           <a:p>
             <a:r>
-              <a:rPr lang="pt-BR" sz="2800" b="1" dirty="0"/>
+              <a:rPr lang="pt-BR" sz="2800" b="1"/>
               <a:t>Criamos os métodos para verificar se o player </a:t>
             </a:r>
             <a:r>
-              <a:rPr lang="pt-BR" sz="2800" b="1" dirty="0" err="1"/>
+              <a:rPr lang="pt-BR" sz="2800" b="1" err="1"/>
               <a:t>esta</a:t>
             </a:r>
             <a:r>
-              <a:rPr lang="pt-BR" sz="2800" b="1" dirty="0"/>
+              <a:rPr lang="pt-BR" sz="2800" b="1"/>
               <a:t> vivo</a:t>
             </a:r>
           </a:p>
@@ -8832,7 +8868,7 @@
           <a:lstStyle/>
           <a:p>
             <a:r>
-              <a:rPr lang="pt-BR" sz="1100" dirty="0">
+              <a:rPr lang="pt-BR" sz="1100">
                 <a:solidFill>
                   <a:srgbClr val="CCCCCC"/>
                 </a:solidFill>
@@ -8841,7 +8877,7 @@
               <a:t>  </a:t>
             </a:r>
             <a:r>
-              <a:rPr lang="pt-BR" sz="2400" dirty="0">
+              <a:rPr lang="pt-BR" sz="2400">
                 <a:solidFill>
                   <a:srgbClr val="CCCCCC"/>
                 </a:solidFill>
@@ -8855,7 +8891,7 @@
           </a:p>
           <a:p>
             <a:r>
-              <a:rPr lang="pt-BR" sz="2400" dirty="0">
+              <a:rPr lang="pt-BR" sz="2400">
                 <a:solidFill>
                   <a:srgbClr val="CCCCCC"/>
                 </a:solidFill>
@@ -8873,7 +8909,7 @@
               <a:t>def</a:t>
             </a:r>
             <a:r>
-              <a:rPr lang="pt-BR" sz="2400" dirty="0">
+              <a:rPr lang="pt-BR" sz="2400">
                 <a:solidFill>
                   <a:srgbClr val="CCCCCC"/>
                 </a:solidFill>
@@ -8891,7 +8927,7 @@
               <a:t>tem_Vida</a:t>
             </a:r>
             <a:r>
-              <a:rPr lang="pt-BR" sz="2400" dirty="0">
+              <a:rPr lang="pt-BR" sz="2400">
                 <a:solidFill>
                   <a:srgbClr val="CCCCCC"/>
                 </a:solidFill>
@@ -8900,7 +8936,7 @@
               <a:t>(</a:t>
             </a:r>
             <a:r>
-              <a:rPr lang="pt-BR" sz="2400" dirty="0">
+              <a:rPr lang="pt-BR" sz="2400">
                 <a:solidFill>
                   <a:srgbClr val="9CDCFE"/>
                 </a:solidFill>
@@ -8909,7 +8945,7 @@
               <a:t>self</a:t>
             </a:r>
             <a:r>
-              <a:rPr lang="pt-BR" sz="2400" dirty="0">
+              <a:rPr lang="pt-BR" sz="2400">
                 <a:solidFill>
                   <a:srgbClr val="CCCCCC"/>
                 </a:solidFill>
@@ -8923,7 +8959,7 @@
           </a:p>
           <a:p>
             <a:r>
-              <a:rPr lang="pt-BR" sz="2400" dirty="0">
+              <a:rPr lang="pt-BR" sz="2400">
                 <a:solidFill>
                   <a:srgbClr val="CCCCCC"/>
                 </a:solidFill>
@@ -8941,7 +8977,7 @@
               <a:t>if</a:t>
             </a:r>
             <a:r>
-              <a:rPr lang="pt-BR" sz="2400" dirty="0">
+              <a:rPr lang="pt-BR" sz="2400">
                 <a:solidFill>
                   <a:srgbClr val="CCCCCC"/>
                 </a:solidFill>
@@ -8977,7 +9013,7 @@
               <a:t>vida</a:t>
             </a:r>
             <a:r>
-              <a:rPr lang="pt-BR" sz="2400" dirty="0">
+              <a:rPr lang="pt-BR" sz="2400">
                 <a:solidFill>
                   <a:srgbClr val="CCCCCC"/>
                 </a:solidFill>
@@ -8986,7 +9022,7 @@
               <a:t> </a:t>
             </a:r>
             <a:r>
-              <a:rPr lang="pt-BR" sz="2400" dirty="0">
+              <a:rPr lang="pt-BR" sz="2400">
                 <a:solidFill>
                   <a:srgbClr val="D4D4D4"/>
                 </a:solidFill>
@@ -8995,7 +9031,7 @@
               <a:t>&lt;=</a:t>
             </a:r>
             <a:r>
-              <a:rPr lang="pt-BR" sz="2400" dirty="0">
+              <a:rPr lang="pt-BR" sz="2400">
                 <a:solidFill>
                   <a:srgbClr val="CCCCCC"/>
                 </a:solidFill>
@@ -9004,7 +9040,7 @@
               <a:t> </a:t>
             </a:r>
             <a:r>
-              <a:rPr lang="pt-BR" sz="2400" dirty="0">
+              <a:rPr lang="pt-BR" sz="2400">
                 <a:solidFill>
                   <a:srgbClr val="B5CEA8"/>
                 </a:solidFill>
@@ -9013,7 +9049,7 @@
               <a:t>0</a:t>
             </a:r>
             <a:r>
-              <a:rPr lang="pt-BR" sz="2400" dirty="0">
+              <a:rPr lang="pt-BR" sz="2400">
                 <a:solidFill>
                   <a:srgbClr val="CCCCCC"/>
                 </a:solidFill>
@@ -9027,7 +9063,7 @@
           </a:p>
           <a:p>
             <a:r>
-              <a:rPr lang="pt-BR" sz="2400" dirty="0">
+              <a:rPr lang="pt-BR" sz="2400">
                 <a:solidFill>
                   <a:srgbClr val="CCCCCC"/>
                 </a:solidFill>
@@ -9036,7 +9072,7 @@
               <a:t>            </a:t>
             </a:r>
             <a:r>
-              <a:rPr lang="pt-BR" sz="2400" dirty="0">
+              <a:rPr lang="pt-BR" sz="2400">
                 <a:solidFill>
                   <a:srgbClr val="DCDCAA"/>
                 </a:solidFill>
@@ -9045,7 +9081,7 @@
               <a:t>print</a:t>
             </a:r>
             <a:r>
-              <a:rPr lang="pt-BR" sz="2400" dirty="0">
+              <a:rPr lang="pt-BR" sz="2400">
                 <a:solidFill>
                   <a:srgbClr val="CCCCCC"/>
                 </a:solidFill>
@@ -9054,7 +9090,7 @@
               <a:t>(</a:t>
             </a:r>
             <a:r>
-              <a:rPr lang="pt-BR" sz="2400" dirty="0">
+              <a:rPr lang="pt-BR" sz="2400">
                 <a:solidFill>
                   <a:srgbClr val="CE9178"/>
                 </a:solidFill>
@@ -9063,7 +9099,7 @@
               <a:t>'</a:t>
             </a:r>
             <a:r>
-              <a:rPr lang="pt-BR" sz="2400" dirty="0">
+              <a:rPr lang="pt-BR" sz="2400">
                 <a:solidFill>
                   <a:srgbClr val="569CD6"/>
                 </a:solidFill>
@@ -9072,7 +9108,7 @@
               <a:t>%s</a:t>
             </a:r>
             <a:r>
-              <a:rPr lang="pt-BR" sz="2400" dirty="0">
+              <a:rPr lang="pt-BR" sz="2400">
                 <a:solidFill>
                   <a:srgbClr val="CE9178"/>
                 </a:solidFill>
@@ -9081,7 +9117,7 @@
               <a:t> foi eliminado'</a:t>
             </a:r>
             <a:r>
-              <a:rPr lang="pt-BR" sz="2400" dirty="0">
+              <a:rPr lang="pt-BR" sz="2400">
                 <a:solidFill>
                   <a:srgbClr val="CCCCCC"/>
                 </a:solidFill>
@@ -9090,7 +9126,7 @@
               <a:t> </a:t>
             </a:r>
             <a:r>
-              <a:rPr lang="pt-BR" sz="2400" dirty="0">
+              <a:rPr lang="pt-BR" sz="2400">
                 <a:solidFill>
                   <a:srgbClr val="D4D4D4"/>
                 </a:solidFill>
@@ -9099,7 +9135,7 @@
               <a:t>%</a:t>
             </a:r>
             <a:r>
-              <a:rPr lang="pt-BR" sz="2400" dirty="0">
+              <a:rPr lang="pt-BR" sz="2400">
                 <a:solidFill>
                   <a:srgbClr val="CCCCCC"/>
                 </a:solidFill>
@@ -9135,7 +9171,7 @@
               <a:t>nome</a:t>
             </a:r>
             <a:r>
-              <a:rPr lang="pt-BR" sz="2400" dirty="0">
+              <a:rPr lang="pt-BR" sz="2400">
                 <a:solidFill>
                   <a:srgbClr val="CCCCCC"/>
                 </a:solidFill>
@@ -9149,7 +9185,7 @@
           </a:p>
           <a:p>
             <a:r>
-              <a:rPr lang="pt-BR" sz="2400" dirty="0">
+              <a:rPr lang="pt-BR" sz="2400">
                 <a:solidFill>
                   <a:srgbClr val="CCCCCC"/>
                 </a:solidFill>
@@ -9185,7 +9221,7 @@
               <a:t>estaVivo</a:t>
             </a:r>
             <a:r>
-              <a:rPr lang="pt-BR" sz="2400" dirty="0">
+              <a:rPr lang="pt-BR" sz="2400">
                 <a:solidFill>
                   <a:srgbClr val="CCCCCC"/>
                 </a:solidFill>
@@ -9194,7 +9230,7 @@
               <a:t> </a:t>
             </a:r>
             <a:r>
-              <a:rPr lang="pt-BR" sz="2400" dirty="0">
+              <a:rPr lang="pt-BR" sz="2400">
                 <a:solidFill>
                   <a:srgbClr val="D4D4D4"/>
                 </a:solidFill>
@@ -9203,7 +9239,7 @@
               <a:t>=</a:t>
             </a:r>
             <a:r>
-              <a:rPr lang="pt-BR" sz="2400" dirty="0">
+              <a:rPr lang="pt-BR" sz="2400">
                 <a:solidFill>
                   <a:srgbClr val="CCCCCC"/>
                 </a:solidFill>
@@ -9212,7 +9248,7 @@
               <a:t> </a:t>
             </a:r>
             <a:r>
-              <a:rPr lang="pt-BR" sz="2400" dirty="0">
+              <a:rPr lang="pt-BR" sz="2400">
                 <a:solidFill>
                   <a:srgbClr val="569CD6"/>
                 </a:solidFill>
@@ -9225,7 +9261,7 @@
             </a:endParaRPr>
           </a:p>
           <a:p>
-            <a:endParaRPr lang="pt-BR" sz="2400" dirty="0">
+            <a:endParaRPr lang="pt-BR" sz="2400">
               <a:solidFill>
                 <a:srgbClr val="CCCCCC"/>
               </a:solidFill>
@@ -9937,7 +9973,7 @@
                 <a:spcPts val="99"/>
               </a:spcBef>
             </a:pPr>
-            <a:endParaRPr lang="pt-BR" sz="3200" spc="-1" dirty="0">
+            <a:endParaRPr lang="pt-BR" sz="3200" spc="-1">
               <a:solidFill>
                 <a:srgbClr val="000000"/>
               </a:solidFill>
@@ -10028,11 +10064,11 @@
           <a:lstStyle/>
           <a:p>
             <a:r>
-              <a:rPr lang="pt-BR" sz="2800" b="1" dirty="0" err="1"/>
+              <a:rPr lang="pt-BR" sz="2800" b="1" err="1"/>
               <a:t>Instaciamos</a:t>
             </a:r>
             <a:r>
-              <a:rPr lang="pt-BR" sz="2800" b="1" dirty="0"/>
+              <a:rPr lang="pt-BR" sz="2800" b="1"/>
               <a:t> os jogadores</a:t>
             </a:r>
           </a:p>
@@ -10070,7 +10106,7 @@
           <a:lstStyle/>
           <a:p>
             <a:r>
-              <a:rPr lang="pt-BR" sz="1100" dirty="0">
+              <a:rPr lang="pt-BR" sz="1100">
                 <a:solidFill>
                   <a:srgbClr val="CCCCCC"/>
                 </a:solidFill>
@@ -10079,7 +10115,7 @@
               <a:t>  </a:t>
             </a:r>
             <a:r>
-              <a:rPr lang="pt-BR" sz="2400" dirty="0">
+              <a:rPr lang="pt-BR" sz="2400">
                 <a:solidFill>
                   <a:srgbClr val="CCCCCC"/>
                 </a:solidFill>
@@ -10093,7 +10129,7 @@
           </a:p>
           <a:p>
             <a:r>
-              <a:rPr lang="pt-BR" sz="2400" dirty="0">
+              <a:rPr lang="pt-BR" sz="2400">
                 <a:solidFill>
                   <a:srgbClr val="CCCCCC"/>
                 </a:solidFill>
@@ -10176,6 +10212,117 @@
     <p:extLst>
       <p:ext uri="{BB962C8B-B14F-4D97-AF65-F5344CB8AC3E}">
         <p14:creationId xmlns:p14="http://schemas.microsoft.com/office/powerpoint/2010/main" val="1673070714"/>
+      </p:ext>
+    </p:extLst>
+  </p:cSld>
+  <p:clrMapOvr>
+    <a:masterClrMapping/>
+  </p:clrMapOvr>
+</p:sld>
+</file>
+
+<file path=ppt/slides/slide8.xml><?xml version="1.0" encoding="utf-8"?>
+<p:sld xmlns:a="http://schemas.openxmlformats.org/drawingml/2006/main" xmlns:r="http://schemas.openxmlformats.org/officeDocument/2006/relationships" xmlns:p="http://schemas.openxmlformats.org/presentationml/2006/main">
+  <p:cSld>
+    <p:bg>
+      <p:bgPr>
+        <a:solidFill>
+          <a:schemeClr val="bg1"/>
+        </a:solidFill>
+        <a:effectLst/>
+      </p:bgPr>
+    </p:bg>
+    <p:spTree>
+      <p:nvGrpSpPr>
+        <p:cNvPr id="1" name=""/>
+        <p:cNvGrpSpPr/>
+        <p:nvPr/>
+      </p:nvGrpSpPr>
+      <p:grpSpPr>
+        <a:xfrm>
+          <a:off x="0" y="0"/>
+          <a:ext cx="0" cy="0"/>
+          <a:chOff x="0" y="0"/>
+          <a:chExt cx="0" cy="0"/>
+        </a:xfrm>
+      </p:grpSpPr>
+      <p:pic>
+        <p:nvPicPr>
+          <p:cNvPr id="3" name="Imagem 2" descr="Código QR&#10;&#10;Descrição gerada automaticamente">
+            <a:extLst>
+              <a:ext uri="{FF2B5EF4-FFF2-40B4-BE49-F238E27FC236}">
+                <a16:creationId xmlns:a16="http://schemas.microsoft.com/office/drawing/2014/main" id="{A5A85269-6B86-D3F6-6C97-447F2ADFBD12}"/>
+              </a:ext>
+            </a:extLst>
+          </p:cNvPr>
+          <p:cNvPicPr>
+            <a:picLocks noChangeAspect="1"/>
+          </p:cNvPicPr>
+          <p:nvPr/>
+        </p:nvPicPr>
+        <p:blipFill>
+          <a:blip r:embed="rId2"/>
+          <a:stretch>
+            <a:fillRect/>
+          </a:stretch>
+        </p:blipFill>
+        <p:spPr>
+          <a:xfrm>
+            <a:off x="2510287" y="2876910"/>
+            <a:ext cx="4152180" cy="4137803"/>
+          </a:xfrm>
+          <a:prstGeom prst="rect">
+            <a:avLst/>
+          </a:prstGeom>
+        </p:spPr>
+      </p:pic>
+      <p:sp>
+        <p:nvSpPr>
+          <p:cNvPr id="4" name="CaixaDeTexto 3">
+            <a:extLst>
+              <a:ext uri="{FF2B5EF4-FFF2-40B4-BE49-F238E27FC236}">
+                <a16:creationId xmlns:a16="http://schemas.microsoft.com/office/drawing/2014/main" id="{8ED9FFCB-A3AD-DEA2-EE28-47A1ACD57471}"/>
+              </a:ext>
+            </a:extLst>
+          </p:cNvPr>
+          <p:cNvSpPr txBox="1"/>
+          <p:nvPr/>
+        </p:nvSpPr>
+        <p:spPr>
+          <a:xfrm>
+            <a:off x="2656267" y="2044520"/>
+            <a:ext cx="4346619" cy="830997"/>
+          </a:xfrm>
+          <a:prstGeom prst="rect">
+            <a:avLst/>
+          </a:prstGeom>
+          <a:noFill/>
+        </p:spPr>
+        <p:txBody>
+          <a:bodyPr rot="0" spcFirstLastPara="0" vertOverflow="overflow" horzOverflow="overflow" vert="horz" wrap="square" lIns="91440" tIns="45720" rIns="91440" bIns="45720" numCol="1" spcCol="0" rtlCol="0" fromWordArt="0" anchor="t" anchorCtr="0" forceAA="0" compatLnSpc="1">
+            <a:prstTxWarp prst="textNoShape">
+              <a:avLst/>
+            </a:prstTxWarp>
+            <a:spAutoFit/>
+          </a:bodyPr>
+          <a:lstStyle/>
+          <a:p>
+            <a:r>
+              <a:rPr lang="pt-BR" sz="2400" b="1"/>
+              <a:t>Acesse o código completo pelo </a:t>
+            </a:r>
+            <a:r>
+              <a:rPr lang="pt-BR" sz="2400" b="1" err="1"/>
+              <a:t>github</a:t>
+            </a:r>
+            <a:endParaRPr lang="pt-BR" sz="2400" b="1"/>
+          </a:p>
+        </p:txBody>
+      </p:sp>
+    </p:spTree>
+    <p:extLst>
+      <p:ext uri="{BB962C8B-B14F-4D97-AF65-F5344CB8AC3E}">
+        <p14:creationId xmlns:p14="http://schemas.microsoft.com/office/powerpoint/2010/main" val="1662063946"/>
       </p:ext>
     </p:extLst>
   </p:cSld>

</xml_diff>